<commit_message>
Update on Hands-on Activity
</commit_message>
<xml_diff>
--- a/Deck/Module 2 - Setting Up Your Automation Environment.pptx
+++ b/Deck/Module 2 - Setting Up Your Automation Environment.pptx
@@ -5,7 +5,7 @@
     <p:sldMasterId id="2147483648" r:id="rId1"/>
   </p:sldMasterIdLst>
   <p:notesMasterIdLst>
-    <p:notesMasterId r:id="rId11"/>
+    <p:notesMasterId r:id="rId12"/>
   </p:notesMasterIdLst>
   <p:sldIdLst>
     <p:sldId id="256" r:id="rId2"/>
@@ -17,6 +17,7 @@
     <p:sldId id="266" r:id="rId8"/>
     <p:sldId id="267" r:id="rId9"/>
     <p:sldId id="260" r:id="rId10"/>
+    <p:sldId id="274" r:id="rId11"/>
   </p:sldIdLst>
   <p:sldSz cx="12192000" cy="6858000"/>
   <p:notesSz cx="6858000" cy="9144000"/>
@@ -205,7 +206,7 @@
           <a:p>
             <a:fld id="{91069913-EAD9-403C-BDF6-9D5D62D51819}" type="datetimeFigureOut">
               <a:rPr lang="en-PH" smtClean="0"/>
-              <a:t>3/25/2025</a:t>
+              <a:t>3/26/2025</a:t>
             </a:fld>
             <a:endParaRPr lang="en-PH"/>
           </a:p>
@@ -706,7 +707,7 @@
           <a:p>
             <a:fld id="{0F0D73FC-F40D-4ECD-9DA2-01ACAE0008EF}" type="datetimeFigureOut">
               <a:rPr lang="en-PH" smtClean="0"/>
-              <a:t>3/25/2025</a:t>
+              <a:t>3/26/2025</a:t>
             </a:fld>
             <a:endParaRPr lang="en-PH"/>
           </a:p>
@@ -906,7 +907,7 @@
           <a:p>
             <a:fld id="{0F0D73FC-F40D-4ECD-9DA2-01ACAE0008EF}" type="datetimeFigureOut">
               <a:rPr lang="en-PH" smtClean="0"/>
-              <a:t>3/25/2025</a:t>
+              <a:t>3/26/2025</a:t>
             </a:fld>
             <a:endParaRPr lang="en-PH"/>
           </a:p>
@@ -1116,7 +1117,7 @@
           <a:p>
             <a:fld id="{0F0D73FC-F40D-4ECD-9DA2-01ACAE0008EF}" type="datetimeFigureOut">
               <a:rPr lang="en-PH" smtClean="0"/>
-              <a:t>3/25/2025</a:t>
+              <a:t>3/26/2025</a:t>
             </a:fld>
             <a:endParaRPr lang="en-PH"/>
           </a:p>
@@ -1316,7 +1317,7 @@
           <a:p>
             <a:fld id="{0F0D73FC-F40D-4ECD-9DA2-01ACAE0008EF}" type="datetimeFigureOut">
               <a:rPr lang="en-PH" smtClean="0"/>
-              <a:t>3/25/2025</a:t>
+              <a:t>3/26/2025</a:t>
             </a:fld>
             <a:endParaRPr lang="en-PH"/>
           </a:p>
@@ -1592,7 +1593,7 @@
           <a:p>
             <a:fld id="{0F0D73FC-F40D-4ECD-9DA2-01ACAE0008EF}" type="datetimeFigureOut">
               <a:rPr lang="en-PH" smtClean="0"/>
-              <a:t>3/25/2025</a:t>
+              <a:t>3/26/2025</a:t>
             </a:fld>
             <a:endParaRPr lang="en-PH"/>
           </a:p>
@@ -1860,7 +1861,7 @@
           <a:p>
             <a:fld id="{0F0D73FC-F40D-4ECD-9DA2-01ACAE0008EF}" type="datetimeFigureOut">
               <a:rPr lang="en-PH" smtClean="0"/>
-              <a:t>3/25/2025</a:t>
+              <a:t>3/26/2025</a:t>
             </a:fld>
             <a:endParaRPr lang="en-PH"/>
           </a:p>
@@ -2275,7 +2276,7 @@
           <a:p>
             <a:fld id="{0F0D73FC-F40D-4ECD-9DA2-01ACAE0008EF}" type="datetimeFigureOut">
               <a:rPr lang="en-PH" smtClean="0"/>
-              <a:t>3/25/2025</a:t>
+              <a:t>3/26/2025</a:t>
             </a:fld>
             <a:endParaRPr lang="en-PH"/>
           </a:p>
@@ -2417,7 +2418,7 @@
           <a:p>
             <a:fld id="{0F0D73FC-F40D-4ECD-9DA2-01ACAE0008EF}" type="datetimeFigureOut">
               <a:rPr lang="en-PH" smtClean="0"/>
-              <a:t>3/25/2025</a:t>
+              <a:t>3/26/2025</a:t>
             </a:fld>
             <a:endParaRPr lang="en-PH"/>
           </a:p>
@@ -2530,7 +2531,7 @@
           <a:p>
             <a:fld id="{0F0D73FC-F40D-4ECD-9DA2-01ACAE0008EF}" type="datetimeFigureOut">
               <a:rPr lang="en-PH" smtClean="0"/>
-              <a:t>3/25/2025</a:t>
+              <a:t>3/26/2025</a:t>
             </a:fld>
             <a:endParaRPr lang="en-PH"/>
           </a:p>
@@ -2843,7 +2844,7 @@
           <a:p>
             <a:fld id="{0F0D73FC-F40D-4ECD-9DA2-01ACAE0008EF}" type="datetimeFigureOut">
               <a:rPr lang="en-PH" smtClean="0"/>
-              <a:t>3/25/2025</a:t>
+              <a:t>3/26/2025</a:t>
             </a:fld>
             <a:endParaRPr lang="en-PH"/>
           </a:p>
@@ -3132,7 +3133,7 @@
           <a:p>
             <a:fld id="{0F0D73FC-F40D-4ECD-9DA2-01ACAE0008EF}" type="datetimeFigureOut">
               <a:rPr lang="en-PH" smtClean="0"/>
-              <a:t>3/25/2025</a:t>
+              <a:t>3/26/2025</a:t>
             </a:fld>
             <a:endParaRPr lang="en-PH"/>
           </a:p>
@@ -3375,7 +3376,7 @@
           <a:p>
             <a:fld id="{0F0D73FC-F40D-4ECD-9DA2-01ACAE0008EF}" type="datetimeFigureOut">
               <a:rPr lang="en-PH" smtClean="0"/>
-              <a:t>3/25/2025</a:t>
+              <a:t>3/26/2025</a:t>
             </a:fld>
             <a:endParaRPr lang="en-PH"/>
           </a:p>
@@ -3993,6 +3994,232 @@
 </p:sld>
 </file>
 
+<file path=ppt/slides/slide10.xml><?xml version="1.0" encoding="utf-8"?>
+<p:sld xmlns:a="http://schemas.openxmlformats.org/drawingml/2006/main" xmlns:r="http://schemas.openxmlformats.org/officeDocument/2006/relationships" xmlns:p="http://schemas.openxmlformats.org/presentationml/2006/main">
+  <p:cSld>
+    <p:spTree>
+      <p:nvGrpSpPr>
+        <p:cNvPr id="1" name="">
+          <a:extLst>
+            <a:ext uri="{FF2B5EF4-FFF2-40B4-BE49-F238E27FC236}">
+              <a16:creationId xmlns:a16="http://schemas.microsoft.com/office/drawing/2014/main" id="{ADE6516F-67C9-8CD8-F6D0-0EDC7DF63D10}"/>
+            </a:ext>
+          </a:extLst>
+        </p:cNvPr>
+        <p:cNvGrpSpPr/>
+        <p:nvPr/>
+      </p:nvGrpSpPr>
+      <p:grpSpPr>
+        <a:xfrm>
+          <a:off x="0" y="0"/>
+          <a:ext cx="0" cy="0"/>
+          <a:chOff x="0" y="0"/>
+          <a:chExt cx="0" cy="0"/>
+        </a:xfrm>
+      </p:grpSpPr>
+      <p:grpSp>
+        <p:nvGrpSpPr>
+          <p:cNvPr id="8" name="Group 7">
+            <a:extLst>
+              <a:ext uri="{FF2B5EF4-FFF2-40B4-BE49-F238E27FC236}">
+                <a16:creationId xmlns:a16="http://schemas.microsoft.com/office/drawing/2014/main" id="{71C7D9C9-4C23-0B84-A305-3D04BE811B19}"/>
+              </a:ext>
+            </a:extLst>
+          </p:cNvPr>
+          <p:cNvGrpSpPr/>
+          <p:nvPr/>
+        </p:nvGrpSpPr>
+        <p:grpSpPr>
+          <a:xfrm>
+            <a:off x="1" y="-4473"/>
+            <a:ext cx="12191999" cy="1798983"/>
+            <a:chOff x="1" y="-4473"/>
+            <a:chExt cx="12191999" cy="1798983"/>
+          </a:xfrm>
+        </p:grpSpPr>
+        <p:pic>
+          <p:nvPicPr>
+            <p:cNvPr id="4" name="image2.png">
+              <a:extLst>
+                <a:ext uri="{FF2B5EF4-FFF2-40B4-BE49-F238E27FC236}">
+                  <a16:creationId xmlns:a16="http://schemas.microsoft.com/office/drawing/2014/main" id="{FAEB3CD1-AA19-7CD9-920B-78AC88B7F19D}"/>
+                </a:ext>
+              </a:extLst>
+            </p:cNvPr>
+            <p:cNvPicPr/>
+            <p:nvPr/>
+          </p:nvPicPr>
+          <p:blipFill>
+            <a:blip r:embed="rId2"/>
+            <a:srcRect r="17643"/>
+            <a:stretch/>
+          </p:blipFill>
+          <p:spPr>
+            <a:xfrm>
+              <a:off x="1" y="0"/>
+              <a:ext cx="6410035" cy="1794510"/>
+            </a:xfrm>
+            <a:prstGeom prst="rect">
+              <a:avLst/>
+            </a:prstGeom>
+            <a:ln/>
+          </p:spPr>
+        </p:pic>
+        <p:pic>
+          <p:nvPicPr>
+            <p:cNvPr id="7" name="image2.png">
+              <a:extLst>
+                <a:ext uri="{FF2B5EF4-FFF2-40B4-BE49-F238E27FC236}">
+                  <a16:creationId xmlns:a16="http://schemas.microsoft.com/office/drawing/2014/main" id="{146B0B4C-D31D-3E08-5750-937C28FB4F50}"/>
+                </a:ext>
+              </a:extLst>
+            </p:cNvPr>
+            <p:cNvPicPr/>
+            <p:nvPr/>
+          </p:nvPicPr>
+          <p:blipFill>
+            <a:blip r:embed="rId2"/>
+            <a:srcRect l="74798" r="17643"/>
+            <a:stretch/>
+          </p:blipFill>
+          <p:spPr>
+            <a:xfrm>
+              <a:off x="5821680" y="-4473"/>
+              <a:ext cx="6370320" cy="1794510"/>
+            </a:xfrm>
+            <a:prstGeom prst="rect">
+              <a:avLst/>
+            </a:prstGeom>
+            <a:ln/>
+          </p:spPr>
+        </p:pic>
+      </p:grpSp>
+      <p:sp>
+        <p:nvSpPr>
+          <p:cNvPr id="12" name="Content Placeholder 11">
+            <a:extLst>
+              <a:ext uri="{FF2B5EF4-FFF2-40B4-BE49-F238E27FC236}">
+                <a16:creationId xmlns:a16="http://schemas.microsoft.com/office/drawing/2014/main" id="{8A363AD9-BD32-944D-EABE-6FB7F53B4E9D}"/>
+              </a:ext>
+            </a:extLst>
+          </p:cNvPr>
+          <p:cNvSpPr>
+            <a:spLocks noGrp="1"/>
+          </p:cNvSpPr>
+          <p:nvPr>
+            <p:ph sz="half" idx="1"/>
+          </p:nvPr>
+        </p:nvSpPr>
+        <p:spPr>
+          <a:xfrm>
+            <a:off x="838199" y="1422400"/>
+            <a:ext cx="10867373" cy="4754563"/>
+          </a:xfrm>
+        </p:spPr>
+        <p:txBody>
+          <a:bodyPr>
+            <a:normAutofit/>
+          </a:bodyPr>
+          <a:lstStyle/>
+          <a:p>
+            <a:pPr marL="0" indent="0">
+              <a:lnSpc>
+                <a:spcPct val="200000"/>
+              </a:lnSpc>
+              <a:buNone/>
+            </a:pPr>
+            <a:r>
+              <a:rPr lang="en-US" sz="1600" b="1" dirty="0">
+                <a:solidFill>
+                  <a:schemeClr val="accent2"/>
+                </a:solidFill>
+                <a:latin typeface="Roboto" panose="02000000000000000000" pitchFamily="2" charset="0"/>
+                <a:ea typeface="Roboto" panose="02000000000000000000" pitchFamily="2" charset="0"/>
+                <a:cs typeface="Roboto" panose="02000000000000000000" pitchFamily="2" charset="0"/>
+              </a:rPr>
+              <a:t>Test Steps</a:t>
+            </a:r>
+          </a:p>
+          <a:p>
+            <a:pPr marL="800100" lvl="1" indent="-342900">
+              <a:lnSpc>
+                <a:spcPct val="200000"/>
+              </a:lnSpc>
+              <a:buFont typeface="+mj-lt"/>
+              <a:buAutoNum type="arabicPeriod"/>
+            </a:pPr>
+            <a:r>
+              <a:rPr lang="en-US" sz="1400" dirty="0">
+                <a:latin typeface="Roboto" panose="02000000000000000000" pitchFamily="2" charset="0"/>
+                <a:ea typeface="Roboto" panose="02000000000000000000" pitchFamily="2" charset="0"/>
+                <a:cs typeface="Roboto" panose="02000000000000000000" pitchFamily="2" charset="0"/>
+              </a:rPr>
+              <a:t>Open Chrome Browser</a:t>
+            </a:r>
+          </a:p>
+          <a:p>
+            <a:pPr marL="800100" lvl="1" indent="-342900">
+              <a:lnSpc>
+                <a:spcPct val="200000"/>
+              </a:lnSpc>
+              <a:buFont typeface="+mj-lt"/>
+              <a:buAutoNum type="arabicPeriod"/>
+            </a:pPr>
+            <a:r>
+              <a:rPr lang="en-US" sz="1400" dirty="0">
+                <a:latin typeface="Roboto" panose="02000000000000000000" pitchFamily="2" charset="0"/>
+                <a:ea typeface="Roboto" panose="02000000000000000000" pitchFamily="2" charset="0"/>
+                <a:cs typeface="Roboto" panose="02000000000000000000" pitchFamily="2" charset="0"/>
+              </a:rPr>
+              <a:t>Navigate to URL </a:t>
+            </a:r>
+            <a:r>
+              <a:rPr lang="en-US" sz="1400" dirty="0">
+                <a:latin typeface="Roboto" panose="02000000000000000000" pitchFamily="2" charset="0"/>
+                <a:ea typeface="Roboto" panose="02000000000000000000" pitchFamily="2" charset="0"/>
+                <a:cs typeface="Roboto" panose="02000000000000000000" pitchFamily="2" charset="0"/>
+                <a:hlinkClick r:id="rId3"/>
+              </a:rPr>
+              <a:t>https://www.saucedemo.com/</a:t>
+            </a:r>
+            <a:endParaRPr lang="en-US" sz="1400" dirty="0">
+              <a:latin typeface="Roboto" panose="02000000000000000000" pitchFamily="2" charset="0"/>
+              <a:ea typeface="Roboto" panose="02000000000000000000" pitchFamily="2" charset="0"/>
+              <a:cs typeface="Roboto" panose="02000000000000000000" pitchFamily="2" charset="0"/>
+            </a:endParaRPr>
+          </a:p>
+          <a:p>
+            <a:pPr marL="800100" lvl="1" indent="-342900">
+              <a:lnSpc>
+                <a:spcPct val="200000"/>
+              </a:lnSpc>
+              <a:buFont typeface="+mj-lt"/>
+              <a:buAutoNum type="arabicPeriod"/>
+            </a:pPr>
+            <a:r>
+              <a:rPr lang="en-US" sz="1400" dirty="0">
+                <a:latin typeface="Roboto" panose="02000000000000000000" pitchFamily="2" charset="0"/>
+                <a:ea typeface="Roboto" panose="02000000000000000000" pitchFamily="2" charset="0"/>
+                <a:cs typeface="Roboto" panose="02000000000000000000" pitchFamily="2" charset="0"/>
+              </a:rPr>
+              <a:t>Close Chrome Browser</a:t>
+            </a:r>
+          </a:p>
+        </p:txBody>
+      </p:sp>
+    </p:spTree>
+    <p:extLst>
+      <p:ext uri="{BB962C8B-B14F-4D97-AF65-F5344CB8AC3E}">
+        <p14:creationId xmlns:p14="http://schemas.microsoft.com/office/powerpoint/2010/main" val="2336974149"/>
+      </p:ext>
+    </p:extLst>
+  </p:cSld>
+  <p:clrMapOvr>
+    <a:masterClrMapping/>
+  </p:clrMapOvr>
+</p:sld>
+</file>
+
 <file path=ppt/slides/slide2.xml><?xml version="1.0" encoding="utf-8"?>
 <p:sld xmlns:a="http://schemas.openxmlformats.org/drawingml/2006/main" xmlns:r="http://schemas.openxmlformats.org/officeDocument/2006/relationships" xmlns:p="http://schemas.openxmlformats.org/presentationml/2006/main">
   <p:cSld>
@@ -6355,7 +6582,7 @@
                 <a:ea typeface="Roboto" panose="02000000000000000000" pitchFamily="2" charset="0"/>
                 <a:cs typeface="Roboto" panose="02000000000000000000" pitchFamily="2" charset="0"/>
               </a:rPr>
-              <a:t>Create a console project named ‘Module2’</a:t>
+              <a:t>Create a new console project named ‘Module2’</a:t>
             </a:r>
           </a:p>
           <a:p>
@@ -6372,72 +6599,22 @@
                 <a:ea typeface="Roboto" panose="02000000000000000000" pitchFamily="2" charset="0"/>
                 <a:cs typeface="Roboto" panose="02000000000000000000" pitchFamily="2" charset="0"/>
               </a:rPr>
-              <a:t>Write a selenium script that opens </a:t>
-            </a:r>
-            <a:r>
-              <a:rPr lang="en-US" sz="1400" b="1" dirty="0">
-                <a:latin typeface="Roboto" panose="02000000000000000000" pitchFamily="2" charset="0"/>
-                <a:ea typeface="Roboto" panose="02000000000000000000" pitchFamily="2" charset="0"/>
-                <a:cs typeface="Roboto" panose="02000000000000000000" pitchFamily="2" charset="0"/>
-              </a:rPr>
-              <a:t>Chrome browser</a:t>
-            </a:r>
-          </a:p>
-          <a:p>
-            <a:pPr marL="800100" lvl="1" indent="-342900">
-              <a:lnSpc>
-                <a:spcPct val="200000"/>
-              </a:lnSpc>
-              <a:buFont typeface="+mj-lt"/>
-              <a:buAutoNum type="arabicPeriod"/>
-            </a:pPr>
+              <a:t>Write a selenium script for the following </a:t>
+            </a:r>
             <a:r>
               <a:rPr lang="en-US" sz="1400" dirty="0">
                 <a:latin typeface="Roboto" panose="02000000000000000000" pitchFamily="2" charset="0"/>
                 <a:ea typeface="Roboto" panose="02000000000000000000" pitchFamily="2" charset="0"/>
                 <a:cs typeface="Roboto" panose="02000000000000000000" pitchFamily="2" charset="0"/>
+                <a:hlinkClick r:id="rId4" action="ppaction://hlinksldjump"/>
               </a:rPr>
-              <a:t>Navigates to this </a:t>
-            </a:r>
-            <a:r>
-              <a:rPr lang="en-US" sz="1400">
-                <a:latin typeface="Roboto" panose="02000000000000000000" pitchFamily="2" charset="0"/>
-                <a:ea typeface="Roboto" panose="02000000000000000000" pitchFamily="2" charset="0"/>
-                <a:cs typeface="Roboto" panose="02000000000000000000" pitchFamily="2" charset="0"/>
-              </a:rPr>
-              <a:t>URL </a:t>
-            </a:r>
-            <a:r>
-              <a:rPr lang="en-US" sz="1400">
-                <a:latin typeface="Roboto" panose="02000000000000000000" pitchFamily="2" charset="0"/>
-                <a:ea typeface="Roboto" panose="02000000000000000000" pitchFamily="2" charset="0"/>
-                <a:cs typeface="Roboto" panose="02000000000000000000" pitchFamily="2" charset="0"/>
-                <a:hlinkClick r:id="rId4"/>
-              </a:rPr>
-              <a:t>https://www.saucedemo.com/</a:t>
+              <a:t>Test Steps</a:t>
             </a:r>
             <a:endParaRPr lang="en-US" sz="1400" dirty="0">
               <a:latin typeface="Roboto" panose="02000000000000000000" pitchFamily="2" charset="0"/>
               <a:ea typeface="Roboto" panose="02000000000000000000" pitchFamily="2" charset="0"/>
               <a:cs typeface="Roboto" panose="02000000000000000000" pitchFamily="2" charset="0"/>
             </a:endParaRPr>
-          </a:p>
-          <a:p>
-            <a:pPr marL="800100" lvl="1" indent="-342900">
-              <a:lnSpc>
-                <a:spcPct val="200000"/>
-              </a:lnSpc>
-              <a:buFont typeface="+mj-lt"/>
-              <a:buAutoNum type="arabicPeriod"/>
-            </a:pPr>
-            <a:r>
-              <a:rPr lang="en-US" sz="1400" dirty="0">
-                <a:latin typeface="Roboto" panose="02000000000000000000" pitchFamily="2" charset="0"/>
-                <a:ea typeface="Roboto" panose="02000000000000000000" pitchFamily="2" charset="0"/>
-                <a:cs typeface="Roboto" panose="02000000000000000000" pitchFamily="2" charset="0"/>
-              </a:rPr>
-              <a:t>Then closes the browser</a:t>
-            </a:r>
           </a:p>
           <a:p>
             <a:pPr marL="800100" lvl="1" indent="-342900">

</xml_diff>